<commit_message>
added audio buttons and changed button size from 1/7 to 1/9
</commit_message>
<xml_diff>
--- a/buttons/Buttons.pptx
+++ b/buttons/Buttons.pptx
@@ -17,7 +17,9 @@
     <p:sldId id="265" r:id="rId11"/>
     <p:sldId id="267" r:id="rId12"/>
     <p:sldId id="268" r:id="rId13"/>
-    <p:sldId id="266" r:id="rId14"/>
+    <p:sldId id="269" r:id="rId14"/>
+    <p:sldId id="270" r:id="rId15"/>
+    <p:sldId id="266" r:id="rId16"/>
   </p:sldIdLst>
   <p:sldSz cx="12192000" cy="6858000"/>
   <p:notesSz cx="6858000" cy="9144000"/>
@@ -3432,6 +3434,238 @@
       </p:grpSpPr>
       <p:sp>
         <p:nvSpPr>
+          <p:cNvPr id="4" name="TextBox 3"/>
+          <p:cNvSpPr txBox="1">
+            <a:spLocks/>
+          </p:cNvSpPr>
+          <p:nvPr/>
+        </p:nvSpPr>
+        <p:spPr>
+          <a:xfrm>
+            <a:off x="182880" y="182880"/>
+            <a:ext cx="10972800" cy="2030730"/>
+          </a:xfrm>
+          <a:prstGeom prst="snip2DiagRect">
+            <a:avLst>
+              <a:gd name="adj1" fmla="val 0"/>
+              <a:gd name="adj2" fmla="val 23234"/>
+            </a:avLst>
+          </a:prstGeom>
+          <a:noFill/>
+          <a:ln w="76200">
+            <a:solidFill>
+              <a:srgbClr val="00B0F0"/>
+            </a:solidFill>
+            <a:round/>
+          </a:ln>
+          <a:effectLst/>
+        </p:spPr>
+        <p:style>
+          <a:lnRef idx="2">
+            <a:schemeClr val="accent1"/>
+          </a:lnRef>
+          <a:fillRef idx="1">
+            <a:schemeClr val="lt1"/>
+          </a:fillRef>
+          <a:effectRef idx="0">
+            <a:schemeClr val="accent1"/>
+          </a:effectRef>
+          <a:fontRef idx="minor">
+            <a:schemeClr val="dk1"/>
+          </a:fontRef>
+        </p:style>
+        <p:txBody>
+          <a:bodyPr wrap="square" tIns="0" bIns="731520" rtlCol="0" anchor="ctr" anchorCtr="0">
+            <a:noAutofit/>
+          </a:bodyPr>
+          <a:lstStyle/>
+          <a:p>
+            <a:pPr algn="ctr"/>
+            <a:r>
+              <a:rPr lang="en-US" sz="13800" b="1" spc="50" dirty="0" smtClean="0">
+                <a:ln w="0">
+                  <a:noFill/>
+                </a:ln>
+                <a:solidFill>
+                  <a:srgbClr val="00B0F0"/>
+                </a:solidFill>
+                <a:latin typeface="TR2N" pitchFamily="2" charset="0"/>
+                <a:ea typeface="TR2N" pitchFamily="2" charset="0"/>
+                <a:cs typeface="Miriam Fixed" panose="020B0509050101010101" pitchFamily="49" charset="-79"/>
+              </a:rPr>
+              <a:t>mute</a:t>
+            </a:r>
+            <a:endParaRPr lang="en-US" sz="13800" b="1" spc="50" dirty="0">
+              <a:ln w="0">
+                <a:noFill/>
+              </a:ln>
+              <a:solidFill>
+                <a:srgbClr val="00B0F0"/>
+              </a:solidFill>
+              <a:effectLst/>
+              <a:latin typeface="TR2N" pitchFamily="2" charset="0"/>
+              <a:ea typeface="TR2N" pitchFamily="2" charset="0"/>
+              <a:cs typeface="Miriam Fixed" panose="020B0509050101010101" pitchFamily="49" charset="-79"/>
+            </a:endParaRPr>
+          </a:p>
+        </p:txBody>
+      </p:sp>
+    </p:spTree>
+    <p:extLst>
+      <p:ext uri="{BB962C8B-B14F-4D97-AF65-F5344CB8AC3E}">
+        <p14:creationId xmlns:p14="http://schemas.microsoft.com/office/powerpoint/2010/main" val="3628638789"/>
+      </p:ext>
+    </p:extLst>
+  </p:cSld>
+  <p:clrMapOvr>
+    <a:masterClrMapping/>
+  </p:clrMapOvr>
+</p:sld>
+</file>
+
+<file path=ppt/slides/slide14.xml><?xml version="1.0" encoding="utf-8"?>
+<p:sld xmlns:a="http://schemas.openxmlformats.org/drawingml/2006/main" xmlns:r="http://schemas.openxmlformats.org/officeDocument/2006/relationships" xmlns:p="http://schemas.openxmlformats.org/presentationml/2006/main">
+  <p:cSld>
+    <p:bg>
+      <p:bgPr>
+        <a:solidFill>
+          <a:schemeClr val="tx1"/>
+        </a:solidFill>
+        <a:effectLst/>
+      </p:bgPr>
+    </p:bg>
+    <p:spTree>
+      <p:nvGrpSpPr>
+        <p:cNvPr id="1" name=""/>
+        <p:cNvGrpSpPr/>
+        <p:nvPr/>
+      </p:nvGrpSpPr>
+      <p:grpSpPr>
+        <a:xfrm>
+          <a:off x="0" y="0"/>
+          <a:ext cx="0" cy="0"/>
+          <a:chOff x="0" y="0"/>
+          <a:chExt cx="0" cy="0"/>
+        </a:xfrm>
+      </p:grpSpPr>
+      <p:sp>
+        <p:nvSpPr>
+          <p:cNvPr id="4" name="TextBox 3"/>
+          <p:cNvSpPr txBox="1">
+            <a:spLocks/>
+          </p:cNvSpPr>
+          <p:nvPr/>
+        </p:nvSpPr>
+        <p:spPr>
+          <a:xfrm>
+            <a:off x="182880" y="182880"/>
+            <a:ext cx="10972800" cy="2030730"/>
+          </a:xfrm>
+          <a:prstGeom prst="snip2DiagRect">
+            <a:avLst>
+              <a:gd name="adj1" fmla="val 0"/>
+              <a:gd name="adj2" fmla="val 23234"/>
+            </a:avLst>
+          </a:prstGeom>
+          <a:noFill/>
+          <a:ln w="76200">
+            <a:solidFill>
+              <a:srgbClr val="00B0F0"/>
+            </a:solidFill>
+            <a:round/>
+          </a:ln>
+          <a:effectLst/>
+        </p:spPr>
+        <p:style>
+          <a:lnRef idx="2">
+            <a:schemeClr val="accent1"/>
+          </a:lnRef>
+          <a:fillRef idx="1">
+            <a:schemeClr val="lt1"/>
+          </a:fillRef>
+          <a:effectRef idx="0">
+            <a:schemeClr val="accent1"/>
+          </a:effectRef>
+          <a:fontRef idx="minor">
+            <a:schemeClr val="dk1"/>
+          </a:fontRef>
+        </p:style>
+        <p:txBody>
+          <a:bodyPr wrap="square" tIns="0" bIns="731520" rtlCol="0" anchor="ctr" anchorCtr="0">
+            <a:noAutofit/>
+          </a:bodyPr>
+          <a:lstStyle/>
+          <a:p>
+            <a:pPr algn="ctr"/>
+            <a:r>
+              <a:rPr lang="en-US" sz="13800" b="1" spc="50" dirty="0" smtClean="0">
+                <a:ln w="0">
+                  <a:noFill/>
+                </a:ln>
+                <a:solidFill>
+                  <a:srgbClr val="00B0F0"/>
+                </a:solidFill>
+                <a:latin typeface="TR2N" pitchFamily="2" charset="0"/>
+                <a:ea typeface="TR2N" pitchFamily="2" charset="0"/>
+                <a:cs typeface="Miriam Fixed" panose="020B0509050101010101" pitchFamily="49" charset="-79"/>
+              </a:rPr>
+              <a:t>music</a:t>
+            </a:r>
+            <a:endParaRPr lang="en-US" sz="13800" b="1" spc="50" dirty="0">
+              <a:ln w="0">
+                <a:noFill/>
+              </a:ln>
+              <a:solidFill>
+                <a:srgbClr val="00B0F0"/>
+              </a:solidFill>
+              <a:effectLst/>
+              <a:latin typeface="TR2N" pitchFamily="2" charset="0"/>
+              <a:ea typeface="TR2N" pitchFamily="2" charset="0"/>
+              <a:cs typeface="Miriam Fixed" panose="020B0509050101010101" pitchFamily="49" charset="-79"/>
+            </a:endParaRPr>
+          </a:p>
+        </p:txBody>
+      </p:sp>
+    </p:spTree>
+    <p:extLst>
+      <p:ext uri="{BB962C8B-B14F-4D97-AF65-F5344CB8AC3E}">
+        <p14:creationId xmlns:p14="http://schemas.microsoft.com/office/powerpoint/2010/main" val="3606617221"/>
+      </p:ext>
+    </p:extLst>
+  </p:cSld>
+  <p:clrMapOvr>
+    <a:masterClrMapping/>
+  </p:clrMapOvr>
+</p:sld>
+</file>
+
+<file path=ppt/slides/slide15.xml><?xml version="1.0" encoding="utf-8"?>
+<p:sld xmlns:a="http://schemas.openxmlformats.org/drawingml/2006/main" xmlns:r="http://schemas.openxmlformats.org/officeDocument/2006/relationships" xmlns:p="http://schemas.openxmlformats.org/presentationml/2006/main">
+  <p:cSld>
+    <p:bg>
+      <p:bgPr>
+        <a:solidFill>
+          <a:schemeClr val="tx1"/>
+        </a:solidFill>
+        <a:effectLst/>
+      </p:bgPr>
+    </p:bg>
+    <p:spTree>
+      <p:nvGrpSpPr>
+        <p:cNvPr id="1" name=""/>
+        <p:cNvGrpSpPr/>
+        <p:nvPr/>
+      </p:nvGrpSpPr>
+      <p:grpSpPr>
+        <a:xfrm>
+          <a:off x="0" y="0"/>
+          <a:ext cx="0" cy="0"/>
+          <a:chOff x="0" y="0"/>
+          <a:chExt cx="0" cy="0"/>
+        </a:xfrm>
+      </p:grpSpPr>
+      <p:sp>
+        <p:nvSpPr>
           <p:cNvPr id="3" name="TextBox 2"/>
           <p:cNvSpPr txBox="1">
             <a:spLocks/>

</xml_diff>